<commit_message>
update to ppt file showing off nmnh-fims client proposal
</commit_message>
<xml_diff>
--- a/offline_docs/fims_client/nmnh_mockup.pptx
+++ b/offline_docs/fims_client/nmnh_mockup.pptx
@@ -1751,8 +1751,8 @@
         </p:nvSpPr>
         <p:spPr>
           <a:xfrm>
-            <a:off x="1962019" y="2800538"/>
-            <a:ext cx="9141101" cy="1549142"/>
+            <a:off x="1962019" y="2677429"/>
+            <a:ext cx="9141101" cy="1795363"/>
           </a:xfrm>
           <a:prstGeom prst="rect">
             <a:avLst/>
@@ -1804,7 +1804,7 @@
           <a:p>
             <a:r>
               <a:rPr lang="en-US" sz="1600" b="0" dirty="0" smtClean="0"/>
-              <a:t>The NMNH-FIMS Client supports offline data entry in a form-based environment.  Users can generate templates, create expeditions, and save </a:t>
+              <a:t>Generate templates for your custom forms on a project by project basis, create expeditions to track your personal data, and enter data without an internet connection.  The FIMS Client is based on the </a:t>
             </a:r>
             <a:r>
               <a:rPr lang="en-US" sz="1600" b="0" dirty="0" err="1" smtClean="0"/>
@@ -1828,7 +1828,7 @@
             </a:r>
             <a:r>
               <a:rPr lang="en-US" sz="1600" b="0" dirty="0" smtClean="0"/>
-              <a:t> for use within the FIMS Client environment.  Data is saved on the client using  </a:t>
+              <a:t> w3c standard, existing FIMS services, and browser based storage.</a:t>
             </a:r>
           </a:p>
         </p:txBody>

</xml_diff>